<commit_message>
edits ran-vars-bigger-number.pptx, add ran-vars-independence.pptx, ran-vars-binomial.pptx
</commit_message>
<xml_diff>
--- a/spring12/slidesS12/ran-vars-bigger-number.pptx
+++ b/spring12/slidesS12/ran-vars-bigger-number.pptx
@@ -5,10 +5,10 @@
     <p:sldMasterId id="2147483648" r:id="rId1"/>
   </p:sldMasterIdLst>
   <p:notesMasterIdLst>
-    <p:notesMasterId r:id="rId14"/>
+    <p:notesMasterId r:id="rId15"/>
   </p:notesMasterIdLst>
   <p:handoutMasterIdLst>
-    <p:handoutMasterId r:id="rId15"/>
+    <p:handoutMasterId r:id="rId16"/>
   </p:handoutMasterIdLst>
   <p:sldIdLst>
     <p:sldId id="257" r:id="rId2"/>
@@ -23,6 +23,7 @@
     <p:sldId id="368" r:id="rId11"/>
     <p:sldId id="265" r:id="rId12"/>
     <p:sldId id="267" r:id="rId13"/>
+    <p:sldId id="370" r:id="rId14"/>
   </p:sldIdLst>
   <p:sldSz cx="9144000" cy="6858000" type="screen4x3"/>
   <p:notesSz cx="9601200" cy="7315200"/>
@@ -1283,6 +1284,98 @@
 </p:notes>
 </file>
 
+<file path=ppt/notesSlides/notesSlide13.xml><?xml version="1.0" encoding="utf-8"?>
+<p:notes xmlns:a="http://schemas.openxmlformats.org/drawingml/2006/main" xmlns:r="http://schemas.openxmlformats.org/officeDocument/2006/relationships" xmlns:p="http://schemas.openxmlformats.org/presentationml/2006/main">
+  <p:cSld>
+    <p:spTree>
+      <p:nvGrpSpPr>
+        <p:cNvPr id="1" name=""/>
+        <p:cNvGrpSpPr/>
+        <p:nvPr/>
+      </p:nvGrpSpPr>
+      <p:grpSpPr>
+        <a:xfrm>
+          <a:off x="0" y="0"/>
+          <a:ext cx="0" cy="0"/>
+          <a:chOff x="0" y="0"/>
+          <a:chExt cx="0" cy="0"/>
+        </a:xfrm>
+      </p:grpSpPr>
+      <p:sp>
+        <p:nvSpPr>
+          <p:cNvPr id="55298" name="Rectangle 7"/>
+          <p:cNvSpPr>
+            <a:spLocks noGrp="1" noChangeArrowheads="1"/>
+          </p:cNvSpPr>
+          <p:nvPr>
+            <p:ph type="sldNum" sz="quarter" idx="5"/>
+          </p:nvPr>
+        </p:nvSpPr>
+        <p:spPr>
+          <a:noFill/>
+        </p:spPr>
+        <p:txBody>
+          <a:bodyPr/>
+          <a:lstStyle/>
+          <a:p>
+            <a:fld id="{CCF6D73D-881C-4C15-8768-B3D24FF458CB}" type="slidenum">
+              <a:rPr lang="en-US" smtClean="0"/>
+              <a:pPr/>
+              <a:t>13</a:t>
+            </a:fld>
+            <a:endParaRPr lang="en-US" smtClean="0"/>
+          </a:p>
+        </p:txBody>
+      </p:sp>
+      <p:sp>
+        <p:nvSpPr>
+          <p:cNvPr id="55299" name="Rectangle 2"/>
+          <p:cNvSpPr>
+            <a:spLocks noGrp="1" noRot="1" noChangeAspect="1" noChangeArrowheads="1" noTextEdit="1"/>
+          </p:cNvSpPr>
+          <p:nvPr>
+            <p:ph type="sldImg"/>
+          </p:nvPr>
+        </p:nvSpPr>
+        <p:spPr>
+          <a:xfrm>
+            <a:off x="2973388" y="549275"/>
+            <a:ext cx="3659187" cy="2743200"/>
+          </a:xfrm>
+          <a:ln/>
+        </p:spPr>
+      </p:sp>
+      <p:sp>
+        <p:nvSpPr>
+          <p:cNvPr id="55300" name="Rectangle 3"/>
+          <p:cNvSpPr>
+            <a:spLocks noGrp="1" noChangeArrowheads="1"/>
+          </p:cNvSpPr>
+          <p:nvPr>
+            <p:ph type="body" idx="1"/>
+          </p:nvPr>
+        </p:nvSpPr>
+        <p:spPr>
+          <a:noFill/>
+          <a:ln/>
+        </p:spPr>
+        <p:txBody>
+          <a:bodyPr/>
+          <a:lstStyle/>
+          <a:p>
+            <a:pPr eaLnBrk="1" hangingPunct="1"/>
+            <a:endParaRPr lang="en-US" smtClean="0"/>
+          </a:p>
+        </p:txBody>
+      </p:sp>
+    </p:spTree>
+  </p:cSld>
+  <p:clrMapOvr>
+    <a:masterClrMapping/>
+  </p:clrMapOvr>
+</p:notes>
+</file>
+
 <file path=ppt/notesSlides/notesSlide2.xml><?xml version="1.0" encoding="utf-8"?>
 <p:notes xmlns:a="http://schemas.openxmlformats.org/drawingml/2006/main" xmlns:r="http://schemas.openxmlformats.org/officeDocument/2006/relationships" xmlns:p="http://schemas.openxmlformats.org/presentationml/2006/main">
   <p:cSld>
@@ -2155,11 +2248,7 @@
             </a:r>
             <a:r>
               <a:rPr lang="en-US" dirty="0" smtClean="0"/>
-              <a:t> </a:t>
-            </a:r>
-            <a:r>
-              <a:rPr lang="en-US" dirty="0" smtClean="0"/>
-              <a:t>12W.</a:t>
+              <a:t> 12W.</a:t>
             </a:r>
             <a:fld id="{FC9265C7-2444-489D-860F-86AAC4235083}" type="slidenum">
               <a:rPr lang="en-US" smtClean="0"/>
@@ -2331,11 +2420,7 @@
             </a:r>
             <a:r>
               <a:rPr lang="en-US" dirty="0" smtClean="0"/>
-              <a:t> </a:t>
-            </a:r>
-            <a:r>
-              <a:rPr lang="en-US" dirty="0" smtClean="0"/>
-              <a:t>12W.</a:t>
+              <a:t> 12W.</a:t>
             </a:r>
             <a:fld id="{7886A709-CED2-48A3-8616-B2655C008ECB}" type="slidenum">
               <a:rPr lang="en-US" smtClean="0"/>
@@ -2428,11 +2513,7 @@
             </a:r>
             <a:r>
               <a:rPr lang="en-US" dirty="0" smtClean="0"/>
-              <a:t> </a:t>
-            </a:r>
-            <a:r>
-              <a:rPr lang="en-US" dirty="0" smtClean="0"/>
-              <a:t>12W.</a:t>
+              <a:t> 12W.</a:t>
             </a:r>
             <a:fld id="{9B55653B-1858-43BF-A49A-533C730B553F}" type="slidenum">
               <a:rPr lang="en-US" smtClean="0"/>
@@ -2498,11 +2579,7 @@
             </a:r>
             <a:r>
               <a:rPr lang="en-US" dirty="0" smtClean="0"/>
-              <a:t> </a:t>
-            </a:r>
-            <a:r>
-              <a:rPr lang="en-US" dirty="0" smtClean="0"/>
-              <a:t>12W.</a:t>
+              <a:t> 12W.</a:t>
             </a:r>
             <a:fld id="{4E62291C-8AD8-4AE0-8F6D-A8437E91FB33}" type="slidenum">
               <a:rPr lang="en-US" smtClean="0"/>
@@ -2710,11 +2787,7 @@
             </a:r>
             <a:r>
               <a:rPr lang="en-US" dirty="0" smtClean="0"/>
-              <a:t> </a:t>
-            </a:r>
-            <a:r>
-              <a:rPr lang="en-US" dirty="0" smtClean="0"/>
-              <a:t>12W.</a:t>
+              <a:t> 12W.</a:t>
             </a:r>
             <a:fld id="{7886A709-CED2-48A3-8616-B2655C008ECB}" type="slidenum">
               <a:rPr lang="en-US" smtClean="0"/>
@@ -2810,22 +2883,7 @@
                 <a:uFillTx/>
                 <a:latin typeface="Comic Sans MS" pitchFamily="66" charset="0"/>
               </a:rPr>
-              <a:t>Albert R Meyer           </a:t>
-            </a:r>
-            <a:r>
-              <a:rPr kumimoji="0" lang="en-US" sz="1200" b="0" i="0" u="none" strike="noStrike" kern="1200" cap="none" spc="0" normalizeH="0" baseline="0" noProof="0" dirty="0" smtClean="0">
-                <a:ln>
-                  <a:noFill/>
-                </a:ln>
-                <a:solidFill>
-                  <a:schemeClr val="tx1"/>
-                </a:solidFill>
-                <a:effectLst/>
-                <a:uLnTx/>
-                <a:uFillTx/>
-                <a:latin typeface="Comic Sans MS" pitchFamily="66" charset="0"/>
-              </a:rPr>
-              <a:t>May 2, 2012</a:t>
+              <a:t>Albert R Meyer           May 2, 2012</a:t>
             </a:r>
             <a:endParaRPr kumimoji="0" lang="en-US" sz="1200" b="0" i="0" u="none" strike="noStrike" kern="1200" cap="none" spc="0" normalizeH="0" baseline="0" noProof="0" dirty="0">
               <a:ln>
@@ -3288,11 +3346,7 @@
             </a:r>
             <a:r>
               <a:rPr lang="en-US" dirty="0" smtClean="0"/>
-              <a:t> </a:t>
-            </a:r>
-            <a:r>
-              <a:rPr lang="en-US" dirty="0" smtClean="0"/>
-              <a:t>12W.</a:t>
+              <a:t> 12W.</a:t>
             </a:r>
             <a:fld id="{E4635AA4-CD52-4E2F-88C8-055AD69B0D4E}" type="slidenum">
               <a:rPr lang="en-US" smtClean="0"/>
@@ -3708,7 +3762,7 @@
           <a:graphicData uri="http://schemas.openxmlformats.org/presentationml/2006/ole">
             <mc:AlternateContent xmlns:mc="http://schemas.openxmlformats.org/markup-compatibility/2006">
               <mc:Choice xmlns:v="urn:schemas-microsoft-com:vml" Requires="v">
-                <p:oleObj spid="_x0000_s580637" name="Equation" r:id="rId4" imgW="914400" imgH="220320" progId="Equation.DSMT4">
+                <p:oleObj spid="_x0000_s580646" name="Equation" r:id="rId4" imgW="914400" imgH="220320" progId="Equation.DSMT4">
                   <p:embed/>
                 </p:oleObj>
               </mc:Choice>
@@ -3881,11 +3935,7 @@
             </a:r>
             <a:r>
               <a:rPr lang="en-US" dirty="0" smtClean="0"/>
-              <a:t> </a:t>
-            </a:r>
-            <a:r>
-              <a:rPr lang="en-US" dirty="0" smtClean="0"/>
-              <a:t>12W.</a:t>
+              <a:t> 12W.</a:t>
             </a:r>
             <a:fld id="{7886A709-CED2-48A3-8616-B2655C008ECB}" type="slidenum">
               <a:rPr lang="en-US" smtClean="0"/>
@@ -3914,7 +3964,7 @@
           <a:graphicData uri="http://schemas.openxmlformats.org/presentationml/2006/ole">
             <mc:AlternateContent xmlns:mc="http://schemas.openxmlformats.org/markup-compatibility/2006">
               <mc:Choice xmlns:v="urn:schemas-microsoft-com:vml" Requires="v">
-                <p:oleObj spid="_x0000_s580638" name="Equation" r:id="rId6" imgW="1447560" imgH="482400" progId="Equation.DSMT4">
+                <p:oleObj spid="_x0000_s580647" name="Equation" r:id="rId6" imgW="1447560" imgH="482400" progId="Equation.DSMT4">
                   <p:embed/>
                 </p:oleObj>
               </mc:Choice>
@@ -3976,8 +4026,8 @@
         </p:nvSpPr>
         <p:spPr>
           <a:xfrm>
-            <a:off x="7162800" y="3962400"/>
-            <a:ext cx="1143000" cy="2171700"/>
+            <a:off x="7226300" y="3962400"/>
+            <a:ext cx="990600" cy="2209800"/>
           </a:xfrm>
           <a:prstGeom prst="rect">
             <a:avLst/>
@@ -4082,30 +4132,21 @@
                             </p:childTnLst>
                           </p:cTn>
                         </p:par>
-                      </p:childTnLst>
-                    </p:cTn>
-                  </p:par>
-                  <p:par>
-                    <p:cTn id="8" fill="hold">
-                      <p:stCondLst>
-                        <p:cond delay="indefinite"/>
-                      </p:stCondLst>
-                      <p:childTnLst>
                         <p:par>
-                          <p:cTn id="9" fill="hold">
+                          <p:cTn id="8" fill="hold">
                             <p:stCondLst>
-                              <p:cond delay="0"/>
+                              <p:cond delay="1000"/>
                             </p:stCondLst>
                             <p:childTnLst>
                               <p:par>
-                                <p:cTn id="10" presetID="35" presetClass="entr" presetSubtype="0" fill="hold" grpId="0" nodeType="clickEffect">
+                                <p:cTn id="9" presetID="35" presetClass="entr" presetSubtype="0" fill="hold" grpId="0" nodeType="afterEffect">
                                   <p:stCondLst>
                                     <p:cond delay="0"/>
                                   </p:stCondLst>
                                   <p:childTnLst>
                                     <p:set>
                                       <p:cBhvr>
-                                        <p:cTn id="11" dur="1" fill="hold">
+                                        <p:cTn id="10" dur="1" fill="hold">
                                           <p:stCondLst>
                                             <p:cond delay="0"/>
                                           </p:stCondLst>
@@ -4123,7 +4164,7 @@
                                     </p:set>
                                     <p:animEffect transition="in" filter="fade">
                                       <p:cBhvr>
-                                        <p:cTn id="12" dur="500"/>
+                                        <p:cTn id="11" dur="1000"/>
                                         <p:tgtEl>
                                           <p:spTgt spid="2"/>
                                         </p:tgtEl>
@@ -4131,7 +4172,7 @@
                                     </p:animEffect>
                                     <p:anim calcmode="lin" valueType="num">
                                       <p:cBhvr>
-                                        <p:cTn id="13" dur="500" fill="hold"/>
+                                        <p:cTn id="12" dur="1000" fill="hold"/>
                                         <p:tgtEl>
                                           <p:spTgt spid="2"/>
                                         </p:tgtEl>
@@ -4154,7 +4195,7 @@
                                     </p:anim>
                                     <p:anim calcmode="lin" valueType="num">
                                       <p:cBhvr>
-                                        <p:cTn id="14" dur="500" fill="hold"/>
+                                        <p:cTn id="13" dur="1000" fill="hold"/>
                                         <p:tgtEl>
                                           <p:spTgt spid="2"/>
                                         </p:tgtEl>
@@ -4177,7 +4218,7 @@
                                     </p:anim>
                                     <p:anim calcmode="lin" valueType="num">
                                       <p:cBhvr>
-                                        <p:cTn id="15" dur="500" fill="hold"/>
+                                        <p:cTn id="14" dur="1000" fill="hold"/>
                                         <p:tgtEl>
                                           <p:spTgt spid="2"/>
                                         </p:tgtEl>
@@ -4276,11 +4317,7 @@
             </a:r>
             <a:r>
               <a:rPr lang="en-US" dirty="0" smtClean="0"/>
-              <a:t> </a:t>
-            </a:r>
-            <a:r>
-              <a:rPr lang="en-US" dirty="0" smtClean="0"/>
-              <a:t>12W.</a:t>
+              <a:t> 12W.</a:t>
             </a:r>
             <a:fld id="{601D9D26-416F-483A-A5D6-37381C6E500B}" type="slidenum">
               <a:rPr lang="en-US" smtClean="0"/>
@@ -4316,22 +4353,14 @@
             <a:pPr eaLnBrk="1" hangingPunct="1"/>
             <a:r>
               <a:rPr lang="en-US" sz="7200" dirty="0" smtClean="0"/>
-              <a:t>Does not </a:t>
-            </a:r>
+              <a:t>Does not matter</a:t>
+            </a:r>
+          </a:p>
+          <a:p>
+            <a:pPr eaLnBrk="1" hangingPunct="1"/>
             <a:r>
               <a:rPr lang="en-US" sz="7200" dirty="0" smtClean="0"/>
-              <a:t>matter</a:t>
-            </a:r>
-          </a:p>
-          <a:p>
-            <a:pPr eaLnBrk="1" hangingPunct="1"/>
-            <a:r>
-              <a:rPr lang="en-US" sz="7200" dirty="0" smtClean="0"/>
-              <a:t>what </a:t>
-            </a:r>
-            <a:r>
-              <a:rPr lang="en-US" sz="7200" dirty="0" smtClean="0"/>
-              <a:t>Team 1 does!</a:t>
+              <a:t>what Team 1 does!</a:t>
             </a:r>
           </a:p>
         </p:txBody>
@@ -4394,9 +4423,18 @@
   <p:clrMapOvr>
     <a:masterClrMapping/>
   </p:clrMapOvr>
-  <p:transition xmlns:p14="http://schemas.microsoft.com/office/powerpoint/2010/main" spd="slow">
-    <p:fade thruBlk="1"/>
-  </p:transition>
+  <mc:AlternateContent xmlns:mc="http://schemas.openxmlformats.org/markup-compatibility/2006">
+    <mc:Choice xmlns:p14="http://schemas.microsoft.com/office/powerpoint/2010/main" Requires="p14">
+      <p:transition spd="slow" p14:dur="1100">
+        <p:fade/>
+      </p:transition>
+    </mc:Choice>
+    <mc:Fallback>
+      <p:transition xmlns:p14="http://schemas.microsoft.com/office/powerpoint/2010/main" spd="slow">
+        <p:fade/>
+      </p:transition>
+    </mc:Fallback>
+  </mc:AlternateContent>
   <p:timing>
     <p:tnLst>
       <p:par>
@@ -4448,11 +4486,7 @@
             </a:r>
             <a:r>
               <a:rPr lang="en-US" dirty="0" smtClean="0"/>
-              <a:t> </a:t>
-            </a:r>
-            <a:r>
-              <a:rPr lang="en-US" dirty="0" smtClean="0"/>
-              <a:t>12W.</a:t>
+              <a:t> 12W.</a:t>
             </a:r>
             <a:fld id="{B48ABEAC-C0A2-414D-A2EC-7337A3B2DB53}" type="slidenum">
               <a:rPr lang="en-US" smtClean="0"/>
@@ -4658,7 +4692,7 @@
           <a:graphicData uri="http://schemas.openxmlformats.org/presentationml/2006/ole">
             <mc:AlternateContent xmlns:mc="http://schemas.openxmlformats.org/markup-compatibility/2006">
               <mc:Choice xmlns:v="urn:schemas-microsoft-com:vml" Requires="v">
-                <p:oleObj spid="_x0000_s5137" name="Equation" r:id="rId4" imgW="190440" imgH="431640" progId="Equation.DSMT4">
+                <p:oleObj spid="_x0000_s5143" name="Equation" r:id="rId4" imgW="190440" imgH="431640" progId="Equation.DSMT4">
                   <p:embed/>
                 </p:oleObj>
               </mc:Choice>
@@ -4719,12 +4753,12 @@
   </p:clrMapOvr>
   <mc:AlternateContent xmlns:mc="http://schemas.openxmlformats.org/markup-compatibility/2006">
     <mc:Choice xmlns:p14="http://schemas.microsoft.com/office/powerpoint/2010/main" Requires="p14">
-      <p:transition spd="med" p14:dur="700">
+      <p:transition spd="slow" p14:dur="1200">
         <p:fade/>
       </p:transition>
     </mc:Choice>
     <mc:Fallback>
-      <p:transition xmlns:p14="http://schemas.microsoft.com/office/powerpoint/2010/main" spd="med">
+      <p:transition xmlns:p14="http://schemas.microsoft.com/office/powerpoint/2010/main" spd="slow">
         <p:fade/>
       </p:transition>
     </mc:Fallback>
@@ -4805,7 +4839,7 @@
                             </p:stCondLst>
                             <p:childTnLst>
                               <p:par>
-                                <p:cTn id="9" presetID="22" presetClass="entr" presetSubtype="1" fill="hold" nodeType="afterEffect">
+                                <p:cTn id="9" presetID="9" presetClass="entr" presetSubtype="0" fill="hold" nodeType="afterEffect">
                                   <p:stCondLst>
                                     <p:cond delay="0"/>
                                   </p:stCondLst>
@@ -4828,7 +4862,7 @@
                                         <p:strVal val="visible"/>
                                       </p:to>
                                     </p:set>
-                                    <p:animEffect transition="in" filter="wipe(up)">
+                                    <p:animEffect transition="in" filter="dissolve">
                                       <p:cBhvr>
                                         <p:cTn id="11" dur="500"/>
                                         <p:tgtEl>
@@ -4842,21 +4876,30 @@
                             </p:childTnLst>
                           </p:cTn>
                         </p:par>
+                      </p:childTnLst>
+                    </p:cTn>
+                  </p:par>
+                  <p:par>
+                    <p:cTn id="12" fill="hold">
+                      <p:stCondLst>
+                        <p:cond delay="indefinite"/>
+                      </p:stCondLst>
+                      <p:childTnLst>
                         <p:par>
-                          <p:cTn id="12" fill="hold">
+                          <p:cTn id="13" fill="hold">
                             <p:stCondLst>
-                              <p:cond delay="1000"/>
+                              <p:cond delay="0"/>
                             </p:stCondLst>
                             <p:childTnLst>
                               <p:par>
-                                <p:cTn id="13" presetID="1" presetClass="entr" presetSubtype="0" fill="hold" nodeType="afterEffect">
+                                <p:cTn id="14" presetID="9" presetClass="entr" presetSubtype="0" fill="hold" nodeType="clickEffect">
                                   <p:stCondLst>
-                                    <p:cond delay="500"/>
+                                    <p:cond delay="0"/>
                                   </p:stCondLst>
                                   <p:childTnLst>
                                     <p:set>
                                       <p:cBhvr>
-                                        <p:cTn id="14" dur="1" fill="hold">
+                                        <p:cTn id="15" dur="1" fill="hold">
                                           <p:stCondLst>
                                             <p:cond delay="0"/>
                                           </p:stCondLst>
@@ -4876,6 +4919,18 @@
                                         <p:strVal val="visible"/>
                                       </p:to>
                                     </p:set>
+                                    <p:animEffect transition="in" filter="dissolve">
+                                      <p:cBhvr>
+                                        <p:cTn id="16" dur="500"/>
+                                        <p:tgtEl>
+                                          <p:spTgt spid="28678">
+                                            <p:txEl>
+                                              <p:pRg st="2" end="2"/>
+                                            </p:txEl>
+                                          </p:spTgt>
+                                        </p:tgtEl>
+                                      </p:cBhvr>
+                                    </p:animEffect>
                                   </p:childTnLst>
                                 </p:cTn>
                               </p:par>
@@ -4904,6 +4959,368 @@
             </p:seq>
           </p:childTnLst>
         </p:cTn>
+      </p:par>
+    </p:tnLst>
+  </p:timing>
+</p:sld>
+</file>
+
+<file path=ppt/slides/slide13.xml><?xml version="1.0" encoding="utf-8"?>
+<p:sld xmlns:a="http://schemas.openxmlformats.org/drawingml/2006/main" xmlns:r="http://schemas.openxmlformats.org/officeDocument/2006/relationships" xmlns:p="http://schemas.openxmlformats.org/presentationml/2006/main">
+  <p:cSld>
+    <p:spTree>
+      <p:nvGrpSpPr>
+        <p:cNvPr id="1" name=""/>
+        <p:cNvGrpSpPr/>
+        <p:nvPr/>
+      </p:nvGrpSpPr>
+      <p:grpSpPr>
+        <a:xfrm>
+          <a:off x="0" y="0"/>
+          <a:ext cx="0" cy="0"/>
+          <a:chOff x="0" y="0"/>
+          <a:chExt cx="0" cy="0"/>
+        </a:xfrm>
+      </p:grpSpPr>
+      <p:sp>
+        <p:nvSpPr>
+          <p:cNvPr id="8" name="Slide Number Placeholder 3"/>
+          <p:cNvSpPr>
+            <a:spLocks noGrp="1"/>
+          </p:cNvSpPr>
+          <p:nvPr>
+            <p:ph type="sldNum" sz="quarter" idx="11"/>
+          </p:nvPr>
+        </p:nvSpPr>
+        <p:spPr/>
+        <p:txBody>
+          <a:bodyPr/>
+          <a:lstStyle/>
+          <a:p>
+            <a:pPr>
+              <a:defRPr/>
+            </a:pPr>
+            <a:r>
+              <a:rPr lang="en-US" dirty="0" err="1"/>
+              <a:t>lec</a:t>
+            </a:r>
+            <a:r>
+              <a:rPr lang="en-US" dirty="0" smtClean="0"/>
+              <a:t> 12W.</a:t>
+            </a:r>
+            <a:fld id="{B48ABEAC-C0A2-414D-A2EC-7337A3B2DB53}" type="slidenum">
+              <a:rPr lang="en-US" smtClean="0"/>
+              <a:pPr>
+                <a:defRPr/>
+              </a:pPr>
+              <a:t>13</a:t>
+            </a:fld>
+            <a:endParaRPr lang="en-US" dirty="0"/>
+          </a:p>
+        </p:txBody>
+      </p:sp>
+      <p:sp>
+        <p:nvSpPr>
+          <p:cNvPr id="5124" name="Rectangle 2"/>
+          <p:cNvSpPr>
+            <a:spLocks noGrp="1" noChangeArrowheads="1"/>
+          </p:cNvSpPr>
+          <p:nvPr>
+            <p:ph type="title" idx="4294967295"/>
+          </p:nvPr>
+        </p:nvSpPr>
+        <p:spPr>
+          <a:xfrm>
+            <a:off x="1336675" y="225425"/>
+            <a:ext cx="6454775" cy="763588"/>
+          </a:xfrm>
+        </p:spPr>
+        <p:txBody>
+          <a:bodyPr/>
+          <a:lstStyle/>
+          <a:p>
+            <a:pPr eaLnBrk="1" hangingPunct="1"/>
+            <a:r>
+              <a:rPr lang="en-US" dirty="0" smtClean="0">
+                <a:solidFill>
+                  <a:schemeClr val="tx1"/>
+                </a:solidFill>
+              </a:rPr>
+              <a:t>Optimal</a:t>
+            </a:r>
+            <a:r>
+              <a:rPr lang="en-US" dirty="0" smtClean="0">
+                <a:solidFill>
+                  <a:srgbClr val="006600"/>
+                </a:solidFill>
+              </a:rPr>
+              <a:t> </a:t>
+            </a:r>
+            <a:r>
+              <a:rPr lang="en-US" dirty="0" smtClean="0"/>
+              <a:t>Strategy</a:t>
+            </a:r>
+            <a:endParaRPr lang="en-US" dirty="0" smtClean="0"/>
+          </a:p>
+        </p:txBody>
+      </p:sp>
+      <p:sp>
+        <p:nvSpPr>
+          <p:cNvPr id="28678" name="Text Box 6"/>
+          <p:cNvSpPr txBox="1">
+            <a:spLocks noChangeArrowheads="1"/>
+          </p:cNvSpPr>
+          <p:nvPr/>
+        </p:nvSpPr>
+        <p:spPr bwMode="auto">
+          <a:xfrm>
+            <a:off x="296862" y="527050"/>
+            <a:ext cx="8550275" cy="5543055"/>
+          </a:xfrm>
+          <a:prstGeom prst="rect">
+            <a:avLst/>
+          </a:prstGeom>
+          <a:noFill/>
+          <a:ln w="9525">
+            <a:noFill/>
+            <a:miter lim="800000"/>
+            <a:headEnd/>
+            <a:tailEnd/>
+          </a:ln>
+        </p:spPr>
+        <p:txBody>
+          <a:bodyPr>
+            <a:spAutoFit/>
+          </a:bodyPr>
+          <a:lstStyle/>
+          <a:p>
+            <a:pPr>
+              <a:lnSpc>
+                <a:spcPct val="120000"/>
+              </a:lnSpc>
+              <a:spcBef>
+                <a:spcPct val="20000"/>
+              </a:spcBef>
+            </a:pPr>
+            <a:r>
+              <a:rPr lang="en-US" sz="6600" dirty="0" smtClean="0">
+                <a:latin typeface="Comic Sans MS" pitchFamily="66" charset="0"/>
+              </a:rPr>
+              <a:t>So</a:t>
+            </a:r>
+          </a:p>
+          <a:p>
+            <a:pPr>
+              <a:lnSpc>
+                <a:spcPct val="120000"/>
+              </a:lnSpc>
+              <a:spcBef>
+                <a:spcPct val="20000"/>
+              </a:spcBef>
+            </a:pPr>
+            <a:r>
+              <a:rPr lang="en-US" sz="6600" dirty="0" err="1" smtClean="0">
+                <a:latin typeface="Comic Sans MS" pitchFamily="66" charset="0"/>
+              </a:rPr>
+              <a:t>Pr</a:t>
+            </a:r>
+            <a:r>
+              <a:rPr lang="en-US" sz="6600" dirty="0">
+                <a:latin typeface="Comic Sans MS" pitchFamily="66" charset="0"/>
+              </a:rPr>
+              <a:t>{Team 2 wins}</a:t>
+            </a:r>
+            <a:r>
+              <a:rPr lang="en-US" sz="6600" dirty="0" smtClean="0">
+                <a:latin typeface="Comic Sans MS" pitchFamily="66" charset="0"/>
+              </a:rPr>
+              <a:t> </a:t>
+            </a:r>
+            <a:r>
+              <a:rPr lang="en-US" sz="6600" b="1" dirty="0" smtClean="0">
+                <a:latin typeface="Euclid Symbol" charset="2"/>
+                <a:cs typeface="Euclid Symbol" charset="2"/>
+                <a:sym typeface="Euclid Symbol" pitchFamily="18" charset="2"/>
+              </a:rPr>
+              <a:t>=</a:t>
+            </a:r>
+          </a:p>
+          <a:p>
+            <a:pPr>
+              <a:lnSpc>
+                <a:spcPct val="120000"/>
+              </a:lnSpc>
+              <a:spcBef>
+                <a:spcPct val="20000"/>
+              </a:spcBef>
+            </a:pPr>
+            <a:r>
+              <a:rPr lang="en-US" sz="6600" dirty="0" smtClean="0">
+                <a:solidFill>
+                  <a:srgbClr val="000000"/>
+                </a:solidFill>
+                <a:latin typeface="Comic Sans MS"/>
+                <a:cs typeface="Comic Sans MS"/>
+                <a:sym typeface="Euclid Symbol" pitchFamily="18" charset="2"/>
+              </a:rPr>
+              <a:t>is </a:t>
+            </a:r>
+            <a:r>
+              <a:rPr lang="en-US" sz="6600" dirty="0" smtClean="0">
+                <a:solidFill>
+                  <a:srgbClr val="660066"/>
+                </a:solidFill>
+                <a:latin typeface="Comic Sans MS"/>
+                <a:cs typeface="Comic Sans MS"/>
+                <a:sym typeface="Euclid Symbol" pitchFamily="18" charset="2"/>
+              </a:rPr>
+              <a:t>optimal</a:t>
+            </a:r>
+            <a:endParaRPr lang="en-US" sz="6600" dirty="0">
+              <a:solidFill>
+                <a:srgbClr val="000000"/>
+              </a:solidFill>
+              <a:latin typeface="Comic Sans MS"/>
+              <a:cs typeface="Comic Sans MS"/>
+              <a:sym typeface="Euclid Symbol" pitchFamily="18" charset="2"/>
+            </a:endParaRPr>
+          </a:p>
+          <a:p>
+            <a:pPr>
+              <a:lnSpc>
+                <a:spcPct val="120000"/>
+              </a:lnSpc>
+              <a:spcBef>
+                <a:spcPct val="20000"/>
+              </a:spcBef>
+            </a:pPr>
+            <a:r>
+              <a:rPr lang="en-US" sz="6600" dirty="0" smtClean="0">
+                <a:solidFill>
+                  <a:srgbClr val="000000"/>
+                </a:solidFill>
+                <a:latin typeface="Comic Sans MS"/>
+                <a:cs typeface="Comic Sans MS"/>
+                <a:sym typeface="Euclid Symbol" pitchFamily="18" charset="2"/>
+              </a:rPr>
+              <a:t>for both </a:t>
+            </a:r>
+            <a:r>
+              <a:rPr lang="en-US" sz="6600" dirty="0" smtClean="0">
+                <a:solidFill>
+                  <a:srgbClr val="000000"/>
+                </a:solidFill>
+                <a:latin typeface="Comic Sans MS"/>
+                <a:cs typeface="Comic Sans MS"/>
+                <a:sym typeface="Euclid Symbol" pitchFamily="18" charset="2"/>
+              </a:rPr>
+              <a:t>teams</a:t>
+            </a:r>
+            <a:endParaRPr lang="en-US" sz="6600" dirty="0" smtClean="0">
+              <a:solidFill>
+                <a:srgbClr val="000000"/>
+              </a:solidFill>
+              <a:latin typeface="Comic Sans MS"/>
+              <a:cs typeface="Comic Sans MS"/>
+              <a:sym typeface="Symbol" pitchFamily="18" charset="2"/>
+            </a:endParaRPr>
+          </a:p>
+        </p:txBody>
+      </p:sp>
+      <p:graphicFrame>
+        <p:nvGraphicFramePr>
+          <p:cNvPr id="5122" name="Object 8"/>
+          <p:cNvGraphicFramePr>
+            <a:graphicFrameLocks noChangeAspect="1"/>
+          </p:cNvGraphicFramePr>
+          <p:nvPr>
+            <p:extLst>
+              <p:ext uri="{D42A27DB-BD31-4B8C-83A1-F6EECF244321}">
+                <p14:modId xmlns:p14="http://schemas.microsoft.com/office/powerpoint/2010/main" val="2999573345"/>
+              </p:ext>
+            </p:extLst>
+          </p:nvPr>
+        </p:nvGraphicFramePr>
+        <p:xfrm>
+          <a:off x="7506044" y="1415923"/>
+          <a:ext cx="1129955" cy="2557848"/>
+        </p:xfrm>
+        <a:graphic>
+          <a:graphicData uri="http://schemas.openxmlformats.org/presentationml/2006/ole">
+            <mc:AlternateContent xmlns:mc="http://schemas.openxmlformats.org/markup-compatibility/2006">
+              <mc:Choice xmlns:v="urn:schemas-microsoft-com:vml" Requires="v">
+                <p:oleObj spid="_x0000_s582659" name="Equation" r:id="rId4" imgW="190440" imgH="431640" progId="Equation.DSMT4">
+                  <p:embed/>
+                </p:oleObj>
+              </mc:Choice>
+              <mc:Fallback>
+                <p:oleObj name="Equation" r:id="rId4" imgW="190440" imgH="431640" progId="Equation.DSMT4">
+                  <p:embed/>
+                  <p:pic>
+                    <p:nvPicPr>
+                      <p:cNvPr id="0" name=""/>
+                      <p:cNvPicPr>
+                        <a:picLocks noChangeAspect="1" noChangeArrowheads="1"/>
+                      </p:cNvPicPr>
+                      <p:nvPr/>
+                    </p:nvPicPr>
+                    <p:blipFill>
+                      <a:blip r:embed="rId5">
+                        <a:extLst>
+                          <a:ext uri="{28A0092B-C50C-407E-A947-70E740481C1C}">
+                            <a14:useLocalDpi xmlns:a14="http://schemas.microsoft.com/office/drawing/2010/main" val="0"/>
+                          </a:ext>
+                        </a:extLst>
+                      </a:blip>
+                      <a:srcRect/>
+                      <a:stretch>
+                        <a:fillRect/>
+                      </a:stretch>
+                    </p:blipFill>
+                    <p:spPr bwMode="auto">
+                      <a:xfrm>
+                        <a:off x="7506044" y="1415923"/>
+                        <a:ext cx="1129955" cy="2557848"/>
+                      </a:xfrm>
+                      <a:prstGeom prst="rect">
+                        <a:avLst/>
+                      </a:prstGeom>
+                      <a:noFill/>
+                      <a:extLst/>
+                    </p:spPr>
+                  </p:pic>
+                </p:oleObj>
+              </mc:Fallback>
+            </mc:AlternateContent>
+          </a:graphicData>
+        </a:graphic>
+      </p:graphicFrame>
+    </p:spTree>
+    <p:extLst>
+      <p:ext uri="{BB962C8B-B14F-4D97-AF65-F5344CB8AC3E}">
+        <p14:creationId xmlns:p14="http://schemas.microsoft.com/office/powerpoint/2010/main" val="3692439481"/>
+      </p:ext>
+    </p:extLst>
+  </p:cSld>
+  <p:clrMapOvr>
+    <a:masterClrMapping/>
+  </p:clrMapOvr>
+  <mc:AlternateContent xmlns:mc="http://schemas.openxmlformats.org/markup-compatibility/2006">
+    <mc:Choice xmlns:p14="http://schemas.microsoft.com/office/powerpoint/2010/main" Requires="p14">
+      <p:transition spd="slow" p14:dur="1200">
+        <p:fade/>
+      </p:transition>
+    </mc:Choice>
+    <mc:Fallback>
+      <p:transition xmlns:p14="http://schemas.microsoft.com/office/powerpoint/2010/main" spd="slow">
+        <p:fade/>
+      </p:transition>
+    </mc:Fallback>
+  </mc:AlternateContent>
+  <p:timing>
+    <p:tnLst>
+      <p:par>
+        <p:cTn xmlns:p14="http://schemas.microsoft.com/office/powerpoint/2010/main" id="1" dur="indefinite" restart="never" nodeType="tmRoot"/>
       </p:par>
     </p:tnLst>
   </p:timing>
@@ -4951,11 +5368,7 @@
             </a:r>
             <a:r>
               <a:rPr lang="en-US" dirty="0" smtClean="0"/>
-              <a:t> </a:t>
-            </a:r>
-            <a:r>
-              <a:rPr lang="en-US" dirty="0" smtClean="0"/>
-              <a:t>12W.</a:t>
+              <a:t> 12W.</a:t>
             </a:r>
             <a:fld id="{29635E03-FCDF-4257-96EB-6C762F5E2419}" type="slidenum">
               <a:rPr lang="en-US" smtClean="0"/>
@@ -5685,11 +6098,7 @@
             </a:r>
             <a:r>
               <a:rPr lang="en-US" dirty="0" smtClean="0"/>
-              <a:t> </a:t>
-            </a:r>
-            <a:r>
-              <a:rPr lang="en-US" dirty="0" smtClean="0"/>
-              <a:t>12W.</a:t>
+              <a:t> 12W.</a:t>
             </a:r>
             <a:fld id="{7E781BB2-0009-4685-941F-B9830CAD66CE}" type="slidenum">
               <a:rPr lang="en-US" smtClean="0"/>
@@ -5829,11 +6238,7 @@
             </a:r>
             <a:r>
               <a:rPr lang="en-US" dirty="0" smtClean="0"/>
-              <a:t> </a:t>
-            </a:r>
-            <a:r>
-              <a:rPr lang="en-US" dirty="0" smtClean="0"/>
-              <a:t>12W.</a:t>
+              <a:t> 12W.</a:t>
             </a:r>
             <a:fld id="{8C735B2F-117E-467F-AA86-C8CA26EAB274}" type="slidenum">
               <a:rPr lang="en-US" smtClean="0"/>
@@ -6375,11 +6780,7 @@
             </a:r>
             <a:r>
               <a:rPr lang="en-US" dirty="0" smtClean="0"/>
-              <a:t> </a:t>
-            </a:r>
-            <a:r>
-              <a:rPr lang="en-US" dirty="0" smtClean="0"/>
-              <a:t>12W.</a:t>
+              <a:t> 12W.</a:t>
             </a:r>
             <a:fld id="{DC9731CB-2F8A-470A-AADF-931B7CDAF7AD}" type="slidenum">
               <a:rPr lang="en-US" smtClean="0"/>
@@ -6580,7 +6981,7 @@
           <a:graphicData uri="http://schemas.openxmlformats.org/presentationml/2006/ole">
             <mc:AlternateContent xmlns:mc="http://schemas.openxmlformats.org/markup-compatibility/2006">
               <mc:Choice xmlns:v="urn:schemas-microsoft-com:vml" Requires="v">
-                <p:oleObj spid="_x0000_s1041" name="Equation" r:id="rId4" imgW="164880" imgH="419040" progId="Equation.DSMT4">
+                <p:oleObj spid="_x0000_s1046" name="Equation" r:id="rId4" imgW="164880" imgH="419040" progId="Equation.DSMT4">
                   <p:embed/>
                 </p:oleObj>
               </mc:Choice>
@@ -6815,15 +7216,24 @@
                                   </p:childTnLst>
                                 </p:cTn>
                               </p:par>
+                            </p:childTnLst>
+                          </p:cTn>
+                        </p:par>
+                        <p:par>
+                          <p:cTn id="17" fill="hold">
+                            <p:stCondLst>
+                              <p:cond delay="500"/>
+                            </p:stCondLst>
+                            <p:childTnLst>
                               <p:par>
-                                <p:cTn id="17" presetID="22" presetClass="entr" presetSubtype="1" fill="hold" nodeType="withEffect">
+                                <p:cTn id="18" presetID="9" presetClass="entr" presetSubtype="0" fill="hold" nodeType="afterEffect">
                                   <p:stCondLst>
                                     <p:cond delay="0"/>
                                   </p:stCondLst>
                                   <p:childTnLst>
                                     <p:set>
                                       <p:cBhvr>
-                                        <p:cTn id="18" dur="1" fill="hold">
+                                        <p:cTn id="19" dur="1" fill="hold">
                                           <p:stCondLst>
                                             <p:cond delay="0"/>
                                           </p:stCondLst>
@@ -6839,9 +7249,9 @@
                                         <p:strVal val="visible"/>
                                       </p:to>
                                     </p:set>
-                                    <p:animEffect transition="in" filter="wipe(up)">
+                                    <p:animEffect transition="in" filter="dissolve">
                                       <p:cBhvr>
-                                        <p:cTn id="19" dur="500"/>
+                                        <p:cTn id="20" dur="500"/>
                                         <p:tgtEl>
                                           <p:spTgt spid="7"/>
                                         </p:tgtEl>
@@ -6922,11 +7332,7 @@
             </a:r>
             <a:r>
               <a:rPr lang="en-US" dirty="0" smtClean="0"/>
-              <a:t> </a:t>
-            </a:r>
-            <a:r>
-              <a:rPr lang="en-US" dirty="0" smtClean="0"/>
-              <a:t>12W.</a:t>
+              <a:t> 12W.</a:t>
             </a:r>
             <a:fld id="{DE5972EA-EB66-4458-A91F-67F065CCE3C5}" type="slidenum">
               <a:rPr lang="en-US" smtClean="0"/>
@@ -7081,7 +7487,7 @@
           <a:graphicData uri="http://schemas.openxmlformats.org/presentationml/2006/ole">
             <mc:AlternateContent xmlns:mc="http://schemas.openxmlformats.org/markup-compatibility/2006">
               <mc:Choice xmlns:v="urn:schemas-microsoft-com:vml" Requires="v">
-                <p:oleObj spid="_x0000_s2065" name="Equation" r:id="rId4" imgW="152280" imgH="419040" progId="Equation.DSMT4">
+                <p:oleObj spid="_x0000_s2070" name="Equation" r:id="rId4" imgW="152280" imgH="419040" progId="Equation.DSMT4">
                   <p:embed/>
                 </p:oleObj>
               </mc:Choice>
@@ -7383,11 +7789,7 @@
             </a:r>
             <a:r>
               <a:rPr lang="en-US" dirty="0" smtClean="0"/>
-              <a:t> </a:t>
-            </a:r>
-            <a:r>
-              <a:rPr lang="en-US" dirty="0" smtClean="0"/>
-              <a:t>12W.</a:t>
+              <a:t> 12W.</a:t>
             </a:r>
             <a:fld id="{C8E1B2AC-ADC5-4B51-80CC-A3F4D8DD7E35}" type="slidenum">
               <a:rPr lang="en-US" smtClean="0"/>
@@ -7521,7 +7923,7 @@
           <a:graphicData uri="http://schemas.openxmlformats.org/presentationml/2006/ole">
             <mc:AlternateContent xmlns:mc="http://schemas.openxmlformats.org/markup-compatibility/2006">
               <mc:Choice xmlns:v="urn:schemas-microsoft-com:vml" Requires="v">
-                <p:oleObj spid="_x0000_s3090" name="Equation" r:id="rId4" imgW="152280" imgH="419040" progId="Equation.DSMT4">
+                <p:oleObj spid="_x0000_s3095" name="Equation" r:id="rId4" imgW="152280" imgH="419040" progId="Equation.DSMT4">
                   <p:embed/>
                 </p:oleObj>
               </mc:Choice>
@@ -7786,7 +8188,7 @@
                             </p:stCondLst>
                             <p:childTnLst>
                               <p:par>
-                                <p:cTn id="14" presetID="22" presetClass="entr" presetSubtype="1" fill="hold" nodeType="afterEffect">
+                                <p:cTn id="14" presetID="9" presetClass="entr" presetSubtype="0" fill="hold" nodeType="afterEffect">
                                   <p:stCondLst>
                                     <p:cond delay="0"/>
                                   </p:stCondLst>
@@ -7809,7 +8211,7 @@
                                         <p:strVal val="visible"/>
                                       </p:to>
                                     </p:set>
-                                    <p:animEffect transition="in" filter="wipe(up)">
+                                    <p:animEffect transition="in" filter="dissolve">
                                       <p:cBhvr>
                                         <p:cTn id="16" dur="500"/>
                                         <p:tgtEl>
@@ -8158,11 +8560,7 @@
             </a:r>
             <a:r>
               <a:rPr lang="en-US" dirty="0" smtClean="0"/>
-              <a:t> </a:t>
-            </a:r>
-            <a:r>
-              <a:rPr lang="en-US" dirty="0" smtClean="0"/>
-              <a:t>12W.</a:t>
+              <a:t> 12W.</a:t>
             </a:r>
             <a:fld id="{7886A709-CED2-48A3-8616-B2655C008ECB}" type="slidenum">
               <a:rPr lang="en-US" smtClean="0"/>
@@ -8180,13 +8578,13 @@
   <p:clrMapOvr>
     <a:masterClrMapping/>
   </p:clrMapOvr>
-  <mc:AlternateContent xmlns:mc="http://schemas.openxmlformats.org/markup-compatibility/2006">
-    <mc:Choice xmlns:p14="http://schemas.microsoft.com/office/powerpoint/2010/main" Requires="p14">
+  <mc:AlternateContent xmlns:mc="http://schemas.openxmlformats.org/markup-compatibility/2006" xmlns:p14="http://schemas.microsoft.com/office/powerpoint/2010/main">
+    <mc:Choice Requires="p14">
       <p:transition spd="med" p14:dur="700">
         <p:fade/>
       </p:transition>
     </mc:Choice>
-    <mc:Fallback>
+    <mc:Fallback xmlns="">
       <p:transition xmlns:p14="http://schemas.microsoft.com/office/powerpoint/2010/main" spd="med">
         <p:fade/>
       </p:transition>
@@ -8602,7 +9000,7 @@
           <a:graphicData uri="http://schemas.openxmlformats.org/presentationml/2006/ole">
             <mc:AlternateContent xmlns:mc="http://schemas.openxmlformats.org/markup-compatibility/2006">
               <mc:Choice xmlns:v="urn:schemas-microsoft-com:vml" Requires="v">
-                <p:oleObj spid="_x0000_s502802" name="Equation" r:id="rId4" imgW="914400" imgH="220320" progId="Equation.DSMT4">
+                <p:oleObj spid="_x0000_s502807" name="Equation" r:id="rId4" imgW="914400" imgH="220320" progId="Equation.DSMT4">
                   <p:embed/>
                 </p:oleObj>
               </mc:Choice>
@@ -8775,11 +9173,7 @@
             </a:r>
             <a:r>
               <a:rPr lang="en-US" dirty="0" smtClean="0"/>
-              <a:t> </a:t>
-            </a:r>
-            <a:r>
-              <a:rPr lang="en-US" dirty="0" smtClean="0"/>
-              <a:t>12W.</a:t>
+              <a:t> 12W.</a:t>
             </a:r>
             <a:fld id="{7886A709-CED2-48A3-8616-B2655C008ECB}" type="slidenum">
               <a:rPr lang="en-US" smtClean="0"/>

</xml_diff>